<commit_message>
Update Data Protection & Privacy.pptx
</commit_message>
<xml_diff>
--- a/Data Protection & Privacy.pptx
+++ b/Data Protection & Privacy.pptx
@@ -5,10 +5,10 @@
     <p:sldMasterId id="2147483672" r:id="rId1"/>
   </p:sldMasterIdLst>
   <p:notesMasterIdLst>
-    <p:notesMasterId r:id="rId26"/>
+    <p:notesMasterId r:id="rId25"/>
   </p:notesMasterIdLst>
   <p:handoutMasterIdLst>
-    <p:handoutMasterId r:id="rId27"/>
+    <p:handoutMasterId r:id="rId26"/>
   </p:handoutMasterIdLst>
   <p:sldIdLst>
     <p:sldId id="256" r:id="rId2"/>
@@ -23,18 +23,17 @@
     <p:sldId id="276" r:id="rId11"/>
     <p:sldId id="280" r:id="rId12"/>
     <p:sldId id="281" r:id="rId13"/>
-    <p:sldId id="282" r:id="rId14"/>
-    <p:sldId id="283" r:id="rId15"/>
-    <p:sldId id="277" r:id="rId16"/>
-    <p:sldId id="264" r:id="rId17"/>
-    <p:sldId id="265" r:id="rId18"/>
-    <p:sldId id="267" r:id="rId19"/>
-    <p:sldId id="269" r:id="rId20"/>
-    <p:sldId id="272" r:id="rId21"/>
-    <p:sldId id="270" r:id="rId22"/>
-    <p:sldId id="271" r:id="rId23"/>
-    <p:sldId id="273" r:id="rId24"/>
-    <p:sldId id="260" r:id="rId25"/>
+    <p:sldId id="283" r:id="rId14"/>
+    <p:sldId id="277" r:id="rId15"/>
+    <p:sldId id="264" r:id="rId16"/>
+    <p:sldId id="265" r:id="rId17"/>
+    <p:sldId id="267" r:id="rId18"/>
+    <p:sldId id="269" r:id="rId19"/>
+    <p:sldId id="272" r:id="rId20"/>
+    <p:sldId id="270" r:id="rId21"/>
+    <p:sldId id="271" r:id="rId22"/>
+    <p:sldId id="273" r:id="rId23"/>
+    <p:sldId id="260" r:id="rId24"/>
   </p:sldIdLst>
   <p:sldSz cx="12192000" cy="6858000"/>
   <p:notesSz cx="6858000" cy="9144000"/>
@@ -4738,7 +4737,7 @@
     </p:spTree>
     <p:extLst>
       <p:ext uri="{BB962C8B-B14F-4D97-AF65-F5344CB8AC3E}">
-        <p14:creationId xmlns:p14="http://schemas.microsoft.com/office/powerpoint/2010/main" val="1589208842"/>
+        <p14:creationId xmlns:p14="http://schemas.microsoft.com/office/powerpoint/2010/main" val="2019263183"/>
       </p:ext>
     </p:extLst>
   </p:cSld>
@@ -4814,7 +4813,7 @@
             <a:pPr rtl="0"/>
             <a:fld id="{C6B3AB32-59DF-41F1-9618-EDFBF5049629}" type="slidenum">
               <a:rPr lang="it-IT" smtClean="0"/>
-              <a:t>14</a:t>
+              <a:t>15</a:t>
             </a:fld>
             <a:endParaRPr lang="it-IT"/>
           </a:p>
@@ -4823,7 +4822,7 @@
     </p:spTree>
     <p:extLst>
       <p:ext uri="{BB962C8B-B14F-4D97-AF65-F5344CB8AC3E}">
-        <p14:creationId xmlns:p14="http://schemas.microsoft.com/office/powerpoint/2010/main" val="2019263183"/>
+        <p14:creationId xmlns:p14="http://schemas.microsoft.com/office/powerpoint/2010/main" val="2846014371"/>
       </p:ext>
     </p:extLst>
   </p:cSld>
@@ -4908,7 +4907,7 @@
     </p:spTree>
     <p:extLst>
       <p:ext uri="{BB962C8B-B14F-4D97-AF65-F5344CB8AC3E}">
-        <p14:creationId xmlns:p14="http://schemas.microsoft.com/office/powerpoint/2010/main" val="2846014371"/>
+        <p14:creationId xmlns:p14="http://schemas.microsoft.com/office/powerpoint/2010/main" val="2887122870"/>
       </p:ext>
     </p:extLst>
   </p:cSld>
@@ -4993,7 +4992,7 @@
     </p:spTree>
     <p:extLst>
       <p:ext uri="{BB962C8B-B14F-4D97-AF65-F5344CB8AC3E}">
-        <p14:creationId xmlns:p14="http://schemas.microsoft.com/office/powerpoint/2010/main" val="2887122870"/>
+        <p14:creationId xmlns:p14="http://schemas.microsoft.com/office/powerpoint/2010/main" val="4260324980"/>
       </p:ext>
     </p:extLst>
   </p:cSld>
@@ -5078,7 +5077,7 @@
     </p:spTree>
     <p:extLst>
       <p:ext uri="{BB962C8B-B14F-4D97-AF65-F5344CB8AC3E}">
-        <p14:creationId xmlns:p14="http://schemas.microsoft.com/office/powerpoint/2010/main" val="4260324980"/>
+        <p14:creationId xmlns:p14="http://schemas.microsoft.com/office/powerpoint/2010/main" val="1840079373"/>
       </p:ext>
     </p:extLst>
   </p:cSld>
@@ -5163,7 +5162,7 @@
     </p:spTree>
     <p:extLst>
       <p:ext uri="{BB962C8B-B14F-4D97-AF65-F5344CB8AC3E}">
-        <p14:creationId xmlns:p14="http://schemas.microsoft.com/office/powerpoint/2010/main" val="1840079373"/>
+        <p14:creationId xmlns:p14="http://schemas.microsoft.com/office/powerpoint/2010/main" val="1383731871"/>
       </p:ext>
     </p:extLst>
   </p:cSld>
@@ -5248,7 +5247,7 @@
     </p:spTree>
     <p:extLst>
       <p:ext uri="{BB962C8B-B14F-4D97-AF65-F5344CB8AC3E}">
-        <p14:creationId xmlns:p14="http://schemas.microsoft.com/office/powerpoint/2010/main" val="1383731871"/>
+        <p14:creationId xmlns:p14="http://schemas.microsoft.com/office/powerpoint/2010/main" val="2756237790"/>
       </p:ext>
     </p:extLst>
   </p:cSld>
@@ -5333,7 +5332,7 @@
     </p:spTree>
     <p:extLst>
       <p:ext uri="{BB962C8B-B14F-4D97-AF65-F5344CB8AC3E}">
-        <p14:creationId xmlns:p14="http://schemas.microsoft.com/office/powerpoint/2010/main" val="2756237790"/>
+        <p14:creationId xmlns:p14="http://schemas.microsoft.com/office/powerpoint/2010/main" val="3357230225"/>
       </p:ext>
     </p:extLst>
   </p:cSld>
@@ -5418,7 +5417,7 @@
     </p:spTree>
     <p:extLst>
       <p:ext uri="{BB962C8B-B14F-4D97-AF65-F5344CB8AC3E}">
-        <p14:creationId xmlns:p14="http://schemas.microsoft.com/office/powerpoint/2010/main" val="3357230225"/>
+        <p14:creationId xmlns:p14="http://schemas.microsoft.com/office/powerpoint/2010/main" val="733612479"/>
       </p:ext>
     </p:extLst>
   </p:cSld>
@@ -5555,10 +5554,11 @@
         </p:nvSpPr>
         <p:spPr/>
         <p:txBody>
-          <a:bodyPr/>
+          <a:bodyPr rtlCol="0"/>
           <a:lstStyle/>
           <a:p>
-            <a:endParaRPr lang="it-IT" dirty="0"/>
+            <a:pPr rtl="0"/>
+            <a:endParaRPr lang="it-IT"/>
           </a:p>
         </p:txBody>
       </p:sp>
@@ -5574,99 +5574,13 @@
         </p:nvSpPr>
         <p:spPr/>
         <p:txBody>
-          <a:bodyPr/>
+          <a:bodyPr rtlCol="0"/>
           <a:lstStyle/>
           <a:p>
             <a:pPr rtl="0"/>
             <a:fld id="{C6B3AB32-59DF-41F1-9618-EDFBF5049629}" type="slidenum">
               <a:rPr lang="it-IT" smtClean="0"/>
               <a:t>23</a:t>
-            </a:fld>
-            <a:endParaRPr lang="it-IT"/>
-          </a:p>
-        </p:txBody>
-      </p:sp>
-    </p:spTree>
-    <p:extLst>
-      <p:ext uri="{BB962C8B-B14F-4D97-AF65-F5344CB8AC3E}">
-        <p14:creationId xmlns:p14="http://schemas.microsoft.com/office/powerpoint/2010/main" val="733612479"/>
-      </p:ext>
-    </p:extLst>
-  </p:cSld>
-  <p:clrMapOvr>
-    <a:masterClrMapping/>
-  </p:clrMapOvr>
-</p:notes>
-</file>
-
-<file path=ppt/notesSlides/notesSlide21.xml><?xml version="1.0" encoding="utf-8"?>
-<p:notes xmlns:a="http://schemas.openxmlformats.org/drawingml/2006/main" xmlns:r="http://schemas.openxmlformats.org/officeDocument/2006/relationships" xmlns:p="http://schemas.openxmlformats.org/presentationml/2006/main">
-  <p:cSld>
-    <p:spTree>
-      <p:nvGrpSpPr>
-        <p:cNvPr id="1" name=""/>
-        <p:cNvGrpSpPr/>
-        <p:nvPr/>
-      </p:nvGrpSpPr>
-      <p:grpSpPr>
-        <a:xfrm>
-          <a:off x="0" y="0"/>
-          <a:ext cx="0" cy="0"/>
-          <a:chOff x="0" y="0"/>
-          <a:chExt cx="0" cy="0"/>
-        </a:xfrm>
-      </p:grpSpPr>
-      <p:sp>
-        <p:nvSpPr>
-          <p:cNvPr id="2" name="Segnaposto immagine diapositiva 1"/>
-          <p:cNvSpPr>
-            <a:spLocks noGrp="1" noRot="1" noChangeAspect="1"/>
-          </p:cNvSpPr>
-          <p:nvPr>
-            <p:ph type="sldImg"/>
-          </p:nvPr>
-        </p:nvSpPr>
-        <p:spPr/>
-      </p:sp>
-      <p:sp>
-        <p:nvSpPr>
-          <p:cNvPr id="3" name="Segnaposto note 2"/>
-          <p:cNvSpPr>
-            <a:spLocks noGrp="1"/>
-          </p:cNvSpPr>
-          <p:nvPr>
-            <p:ph type="body" idx="1"/>
-          </p:nvPr>
-        </p:nvSpPr>
-        <p:spPr/>
-        <p:txBody>
-          <a:bodyPr rtlCol="0"/>
-          <a:lstStyle/>
-          <a:p>
-            <a:pPr rtl="0"/>
-            <a:endParaRPr lang="it-IT"/>
-          </a:p>
-        </p:txBody>
-      </p:sp>
-      <p:sp>
-        <p:nvSpPr>
-          <p:cNvPr id="4" name="Segnaposto numero diapositiva 3"/>
-          <p:cNvSpPr>
-            <a:spLocks noGrp="1"/>
-          </p:cNvSpPr>
-          <p:nvPr>
-            <p:ph type="sldNum" sz="quarter" idx="5"/>
-          </p:nvPr>
-        </p:nvSpPr>
-        <p:spPr/>
-        <p:txBody>
-          <a:bodyPr rtlCol="0"/>
-          <a:lstStyle/>
-          <a:p>
-            <a:pPr rtl="0"/>
-            <a:fld id="{C6B3AB32-59DF-41F1-9618-EDFBF5049629}" type="slidenum">
-              <a:rPr lang="it-IT" smtClean="0"/>
-              <a:t>24</a:t>
             </a:fld>
             <a:endParaRPr lang="it-IT"/>
           </a:p>
@@ -11308,328 +11222,6 @@
         </p:nvSpPr>
         <p:spPr>
           <a:xfrm>
-            <a:off x="825519" y="1930345"/>
-            <a:ext cx="10785290" cy="923330"/>
-          </a:xfrm>
-          <a:prstGeom prst="rect">
-            <a:avLst/>
-          </a:prstGeom>
-          <a:noFill/>
-        </p:spPr>
-        <p:txBody>
-          <a:bodyPr wrap="square" rtlCol="0">
-            <a:spAutoFit/>
-          </a:bodyPr>
-          <a:lstStyle/>
-          <a:p>
-            <a:r>
-              <a:rPr lang="en-GB" dirty="0">
-                <a:effectLst/>
-                <a:latin typeface="Berlin Sans FB" panose="020E0602020502020306" pitchFamily="34" charset="77"/>
-              </a:rPr>
-              <a:t>The 'Suppress MM' function computes the MM/IL ratio and arranges the elements in descending order of this ratio. It then invokes the 'm' method to suppress the moles. In the main program, this function is iteratively called until no more minimal moles remain in the dataset, and corresponding logs and prints are generated.</a:t>
-            </a:r>
-          </a:p>
-        </p:txBody>
-      </p:sp>
-      <p:pic>
-        <p:nvPicPr>
-          <p:cNvPr id="5" name="Picture 4" descr="A screen shot of a computer code&#10;&#10;Description automatically generated">
-            <a:extLst>
-              <a:ext uri="{FF2B5EF4-FFF2-40B4-BE49-F238E27FC236}">
-                <a16:creationId xmlns:a16="http://schemas.microsoft.com/office/drawing/2014/main" id="{04E4936B-4C76-CDEF-6A4E-BB9766C10D2D}"/>
-              </a:ext>
-            </a:extLst>
-          </p:cNvPr>
-          <p:cNvPicPr>
-            <a:picLocks noChangeAspect="1"/>
-          </p:cNvPicPr>
-          <p:nvPr/>
-        </p:nvPicPr>
-        <p:blipFill rotWithShape="1">
-          <a:blip r:embed="rId3"/>
-          <a:srcRect l="1893" r="1787" b="9297"/>
-          <a:stretch/>
-        </p:blipFill>
-        <p:spPr>
-          <a:xfrm>
-            <a:off x="226242" y="3744263"/>
-            <a:ext cx="5712644" cy="2522727"/>
-          </a:xfrm>
-          <a:prstGeom prst="roundRect">
-            <a:avLst>
-              <a:gd name="adj" fmla="val 16667"/>
-            </a:avLst>
-          </a:prstGeom>
-          <a:ln>
-            <a:noFill/>
-          </a:ln>
-          <a:effectLst>
-            <a:outerShdw blurRad="76200" dist="38100" dir="7800000" algn="tl" rotWithShape="0">
-              <a:srgbClr val="000000">
-                <a:alpha val="40000"/>
-              </a:srgbClr>
-            </a:outerShdw>
-          </a:effectLst>
-          <a:scene3d>
-            <a:camera prst="orthographicFront"/>
-            <a:lightRig rig="contrasting" dir="t">
-              <a:rot lat="0" lon="0" rev="4200000"/>
-            </a:lightRig>
-          </a:scene3d>
-          <a:sp3d prstMaterial="plastic">
-            <a:bevelT w="381000" h="114300" prst="relaxedInset"/>
-            <a:contourClr>
-              <a:srgbClr val="969696"/>
-            </a:contourClr>
-          </a:sp3d>
-        </p:spPr>
-      </p:pic>
-      <p:pic>
-        <p:nvPicPr>
-          <p:cNvPr id="7" name="Picture 6" descr="A computer screen with text&#10;&#10;Description automatically generated">
-            <a:extLst>
-              <a:ext uri="{FF2B5EF4-FFF2-40B4-BE49-F238E27FC236}">
-                <a16:creationId xmlns:a16="http://schemas.microsoft.com/office/drawing/2014/main" id="{F758F867-397C-6618-E328-23D2C0229910}"/>
-              </a:ext>
-            </a:extLst>
-          </p:cNvPr>
-          <p:cNvPicPr>
-            <a:picLocks noChangeAspect="1"/>
-          </p:cNvPicPr>
-          <p:nvPr/>
-        </p:nvPicPr>
-        <p:blipFill rotWithShape="1">
-          <a:blip r:embed="rId4"/>
-          <a:srcRect l="1960" r="2739"/>
-          <a:stretch/>
-        </p:blipFill>
-        <p:spPr>
-          <a:xfrm>
-            <a:off x="6715029" y="3519727"/>
-            <a:ext cx="5143891" cy="2971800"/>
-          </a:xfrm>
-          <a:prstGeom prst="roundRect">
-            <a:avLst>
-              <a:gd name="adj" fmla="val 16667"/>
-            </a:avLst>
-          </a:prstGeom>
-          <a:ln>
-            <a:noFill/>
-          </a:ln>
-          <a:effectLst>
-            <a:outerShdw blurRad="76200" dist="38100" dir="7800000" algn="tl" rotWithShape="0">
-              <a:srgbClr val="000000">
-                <a:alpha val="40000"/>
-              </a:srgbClr>
-            </a:outerShdw>
-          </a:effectLst>
-          <a:scene3d>
-            <a:camera prst="orthographicFront"/>
-            <a:lightRig rig="contrasting" dir="t">
-              <a:rot lat="0" lon="0" rev="4200000"/>
-            </a:lightRig>
-          </a:scene3d>
-          <a:sp3d prstMaterial="plastic">
-            <a:bevelT w="381000" h="114300" prst="relaxedInset"/>
-            <a:contourClr>
-              <a:srgbClr val="969696"/>
-            </a:contourClr>
-          </a:sp3d>
-        </p:spPr>
-      </p:pic>
-      <p:sp>
-        <p:nvSpPr>
-          <p:cNvPr id="11" name="TextBox 10">
-            <a:extLst>
-              <a:ext uri="{FF2B5EF4-FFF2-40B4-BE49-F238E27FC236}">
-                <a16:creationId xmlns:a16="http://schemas.microsoft.com/office/drawing/2014/main" id="{1F03138C-DFB4-971B-9C6B-444001AB8E44}"/>
-              </a:ext>
-            </a:extLst>
-          </p:cNvPr>
-          <p:cNvSpPr txBox="1"/>
-          <p:nvPr/>
-        </p:nvSpPr>
-        <p:spPr>
-          <a:xfrm>
-            <a:off x="2347274" y="3335061"/>
-            <a:ext cx="1913641" cy="369332"/>
-          </a:xfrm>
-          <a:prstGeom prst="rect">
-            <a:avLst/>
-          </a:prstGeom>
-          <a:noFill/>
-        </p:spPr>
-        <p:txBody>
-          <a:bodyPr wrap="square" rtlCol="0">
-            <a:spAutoFit/>
-          </a:bodyPr>
-          <a:lstStyle/>
-          <a:p>
-            <a:r>
-              <a:rPr lang="en-GB" b="1" dirty="0">
-                <a:latin typeface="Berlin Sans FB" panose="020E0602020502020306" pitchFamily="34" charset="77"/>
-              </a:rPr>
-              <a:t>H</a:t>
-            </a:r>
-            <a:r>
-              <a:rPr lang="en-IT" b="1" dirty="0">
-                <a:latin typeface="Berlin Sans FB" panose="020E0602020502020306" pitchFamily="34" charset="77"/>
-              </a:rPr>
-              <a:t>kp.class</a:t>
-            </a:r>
-          </a:p>
-        </p:txBody>
-      </p:sp>
-      <p:sp>
-        <p:nvSpPr>
-          <p:cNvPr id="12" name="TextBox 11">
-            <a:extLst>
-              <a:ext uri="{FF2B5EF4-FFF2-40B4-BE49-F238E27FC236}">
-                <a16:creationId xmlns:a16="http://schemas.microsoft.com/office/drawing/2014/main" id="{FE07C78A-750E-70D0-FB28-6236B97E4211}"/>
-              </a:ext>
-            </a:extLst>
-          </p:cNvPr>
-          <p:cNvSpPr txBox="1"/>
-          <p:nvPr/>
-        </p:nvSpPr>
-        <p:spPr>
-          <a:xfrm>
-            <a:off x="8759071" y="3155539"/>
-            <a:ext cx="1913641" cy="369332"/>
-          </a:xfrm>
-          <a:prstGeom prst="rect">
-            <a:avLst/>
-          </a:prstGeom>
-          <a:noFill/>
-        </p:spPr>
-        <p:txBody>
-          <a:bodyPr wrap="square" rtlCol="0">
-            <a:spAutoFit/>
-          </a:bodyPr>
-          <a:lstStyle/>
-          <a:p>
-            <a:r>
-              <a:rPr lang="it-IT" b="1" dirty="0" err="1">
-                <a:latin typeface="Berlin Sans FB" panose="020E0602020502020306" pitchFamily="34" charset="77"/>
-              </a:rPr>
-              <a:t>Main.py</a:t>
-            </a:r>
-            <a:endParaRPr lang="en-IT" b="1" dirty="0">
-              <a:latin typeface="Berlin Sans FB" panose="020E0602020502020306" pitchFamily="34" charset="77"/>
-            </a:endParaRPr>
-          </a:p>
-        </p:txBody>
-      </p:sp>
-    </p:spTree>
-    <p:extLst>
-      <p:ext uri="{BB962C8B-B14F-4D97-AF65-F5344CB8AC3E}">
-        <p14:creationId xmlns:p14="http://schemas.microsoft.com/office/powerpoint/2010/main" val="3747038118"/>
-      </p:ext>
-    </p:extLst>
-  </p:cSld>
-  <p:clrMapOvr>
-    <a:masterClrMapping/>
-  </p:clrMapOvr>
-</p:sld>
-</file>
-
-<file path=ppt/slides/slide14.xml><?xml version="1.0" encoding="utf-8"?>
-<p:sld xmlns:a="http://schemas.openxmlformats.org/drawingml/2006/main" xmlns:r="http://schemas.openxmlformats.org/officeDocument/2006/relationships" xmlns:p="http://schemas.openxmlformats.org/presentationml/2006/main">
-  <p:cSld>
-    <p:spTree>
-      <p:nvGrpSpPr>
-        <p:cNvPr id="1" name=""/>
-        <p:cNvGrpSpPr/>
-        <p:nvPr/>
-      </p:nvGrpSpPr>
-      <p:grpSpPr>
-        <a:xfrm>
-          <a:off x="0" y="0"/>
-          <a:ext cx="0" cy="0"/>
-          <a:chOff x="0" y="0"/>
-          <a:chExt cx="0" cy="0"/>
-        </a:xfrm>
-      </p:grpSpPr>
-      <p:sp>
-        <p:nvSpPr>
-          <p:cNvPr id="2" name="Titolo 1">
-            <a:extLst>
-              <a:ext uri="{FF2B5EF4-FFF2-40B4-BE49-F238E27FC236}">
-                <a16:creationId xmlns:a16="http://schemas.microsoft.com/office/drawing/2014/main" id="{921633EB-7DCB-4DDC-80AF-C885A3EE1245}"/>
-              </a:ext>
-            </a:extLst>
-          </p:cNvPr>
-          <p:cNvSpPr>
-            <a:spLocks noGrp="1"/>
-          </p:cNvSpPr>
-          <p:nvPr>
-            <p:ph type="title"/>
-          </p:nvPr>
-        </p:nvSpPr>
-        <p:spPr>
-          <a:xfrm>
-            <a:off x="581193" y="729658"/>
-            <a:ext cx="11029616" cy="988332"/>
-          </a:xfrm>
-        </p:spPr>
-        <p:txBody>
-          <a:bodyPr rtlCol="0" anchor="b">
-            <a:normAutofit/>
-          </a:bodyPr>
-          <a:lstStyle/>
-          <a:p>
-            <a:pPr rtl="0"/>
-            <a:r>
-              <a:rPr lang="it-IT" dirty="0" err="1">
-                <a:latin typeface="Berlin Sans FB" panose="020E0602020502020306" pitchFamily="34" charset="0"/>
-              </a:rPr>
-              <a:t>Suppress</a:t>
-            </a:r>
-            <a:r>
-              <a:rPr lang="it-IT" dirty="0">
-                <a:latin typeface="Berlin Sans FB" panose="020E0602020502020306" pitchFamily="34" charset="0"/>
-              </a:rPr>
-              <a:t> </a:t>
-            </a:r>
-            <a:r>
-              <a:rPr lang="it-IT" dirty="0" err="1">
-                <a:latin typeface="Berlin Sans FB" panose="020E0602020502020306" pitchFamily="34" charset="0"/>
-              </a:rPr>
-              <a:t>minimal</a:t>
-            </a:r>
-            <a:r>
-              <a:rPr lang="it-IT" dirty="0">
-                <a:latin typeface="Berlin Sans FB" panose="020E0602020502020306" pitchFamily="34" charset="0"/>
-              </a:rPr>
-              <a:t> </a:t>
-            </a:r>
-            <a:r>
-              <a:rPr lang="it-IT" dirty="0" err="1">
-                <a:latin typeface="Berlin Sans FB" panose="020E0602020502020306" pitchFamily="34" charset="0"/>
-              </a:rPr>
-              <a:t>moles</a:t>
-            </a:r>
-            <a:endParaRPr lang="it-IT" dirty="0">
-              <a:latin typeface="Berlin Sans FB" panose="020E0602020502020306" pitchFamily="34" charset="0"/>
-            </a:endParaRPr>
-          </a:p>
-        </p:txBody>
-      </p:sp>
-      <p:sp>
-        <p:nvSpPr>
-          <p:cNvPr id="8" name="TextBox 7">
-            <a:extLst>
-              <a:ext uri="{FF2B5EF4-FFF2-40B4-BE49-F238E27FC236}">
-                <a16:creationId xmlns:a16="http://schemas.microsoft.com/office/drawing/2014/main" id="{BC566EA7-B4A7-5EE4-853A-DD69764D763B}"/>
-              </a:ext>
-            </a:extLst>
-          </p:cNvPr>
-          <p:cNvSpPr txBox="1"/>
-          <p:nvPr/>
-        </p:nvSpPr>
-        <p:spPr>
-          <a:xfrm>
             <a:off x="7390615" y="1931691"/>
             <a:ext cx="4305805" cy="1754326"/>
           </a:xfrm>
@@ -11842,7 +11434,7 @@
 </p:sld>
 </file>
 
-<file path=ppt/slides/slide15.xml><?xml version="1.0" encoding="utf-8"?>
+<file path=ppt/slides/slide14.xml><?xml version="1.0" encoding="utf-8"?>
 <p:sld xmlns:a="http://schemas.openxmlformats.org/drawingml/2006/main" xmlns:r="http://schemas.openxmlformats.org/officeDocument/2006/relationships" xmlns:p="http://schemas.openxmlformats.org/presentationml/2006/main">
   <p:cSld>
     <p:spTree>
@@ -11959,7 +11551,7 @@
 </p:sld>
 </file>
 
-<file path=ppt/slides/slide16.xml><?xml version="1.0" encoding="utf-8"?>
+<file path=ppt/slides/slide15.xml><?xml version="1.0" encoding="utf-8"?>
 <p:sld xmlns:a="http://schemas.openxmlformats.org/drawingml/2006/main" xmlns:r="http://schemas.openxmlformats.org/officeDocument/2006/relationships" xmlns:p="http://schemas.openxmlformats.org/presentationml/2006/main">
   <p:cSld>
     <p:spTree>
@@ -12223,7 +11815,7 @@
 </p:sld>
 </file>
 
-<file path=ppt/slides/slide17.xml><?xml version="1.0" encoding="utf-8"?>
+<file path=ppt/slides/slide16.xml><?xml version="1.0" encoding="utf-8"?>
 <p:sld xmlns:a="http://schemas.openxmlformats.org/drawingml/2006/main" xmlns:r="http://schemas.openxmlformats.org/officeDocument/2006/relationships" xmlns:p="http://schemas.openxmlformats.org/presentationml/2006/main">
   <p:cSld>
     <p:spTree>
@@ -12405,7 +11997,7 @@
 </p:sld>
 </file>
 
-<file path=ppt/slides/slide18.xml><?xml version="1.0" encoding="utf-8"?>
+<file path=ppt/slides/slide17.xml><?xml version="1.0" encoding="utf-8"?>
 <p:sld xmlns:a="http://schemas.openxmlformats.org/drawingml/2006/main" xmlns:r="http://schemas.openxmlformats.org/officeDocument/2006/relationships" xmlns:p="http://schemas.openxmlformats.org/presentationml/2006/main">
   <p:cSld>
     <p:spTree>
@@ -12613,7 +12205,7 @@
 </p:sld>
 </file>
 
-<file path=ppt/slides/slide19.xml><?xml version="1.0" encoding="utf-8"?>
+<file path=ppt/slides/slide18.xml><?xml version="1.0" encoding="utf-8"?>
 <p:sld xmlns:a="http://schemas.openxmlformats.org/drawingml/2006/main" xmlns:r="http://schemas.openxmlformats.org/officeDocument/2006/relationships" xmlns:p="http://schemas.openxmlformats.org/presentationml/2006/main">
   <p:cSld>
     <p:spTree>
@@ -12768,6 +12360,116 @@
     <p:extLst>
       <p:ext uri="{BB962C8B-B14F-4D97-AF65-F5344CB8AC3E}">
         <p14:creationId xmlns:p14="http://schemas.microsoft.com/office/powerpoint/2010/main" val="1435791885"/>
+      </p:ext>
+    </p:extLst>
+  </p:cSld>
+  <p:clrMapOvr>
+    <a:masterClrMapping/>
+  </p:clrMapOvr>
+</p:sld>
+</file>
+
+<file path=ppt/slides/slide19.xml><?xml version="1.0" encoding="utf-8"?>
+<p:sld xmlns:a="http://schemas.openxmlformats.org/drawingml/2006/main" xmlns:r="http://schemas.openxmlformats.org/officeDocument/2006/relationships" xmlns:p="http://schemas.openxmlformats.org/presentationml/2006/main">
+  <p:cSld>
+    <p:spTree>
+      <p:nvGrpSpPr>
+        <p:cNvPr id="1" name=""/>
+        <p:cNvGrpSpPr/>
+        <p:nvPr/>
+      </p:nvGrpSpPr>
+      <p:grpSpPr>
+        <a:xfrm>
+          <a:off x="0" y="0"/>
+          <a:ext cx="0" cy="0"/>
+          <a:chOff x="0" y="0"/>
+          <a:chExt cx="0" cy="0"/>
+        </a:xfrm>
+      </p:grpSpPr>
+      <p:sp>
+        <p:nvSpPr>
+          <p:cNvPr id="2" name="Titolo 1">
+            <a:extLst>
+              <a:ext uri="{FF2B5EF4-FFF2-40B4-BE49-F238E27FC236}">
+                <a16:creationId xmlns:a16="http://schemas.microsoft.com/office/drawing/2014/main" id="{921633EB-7DCB-4DDC-80AF-C885A3EE1245}"/>
+              </a:ext>
+            </a:extLst>
+          </p:cNvPr>
+          <p:cNvSpPr>
+            <a:spLocks noGrp="1"/>
+          </p:cNvSpPr>
+          <p:nvPr>
+            <p:ph type="title"/>
+          </p:nvPr>
+        </p:nvSpPr>
+        <p:spPr>
+          <a:xfrm>
+            <a:off x="581193" y="729658"/>
+            <a:ext cx="11029616" cy="988332"/>
+          </a:xfrm>
+        </p:spPr>
+        <p:txBody>
+          <a:bodyPr rtlCol="0" anchor="b">
+            <a:normAutofit/>
+          </a:bodyPr>
+          <a:lstStyle/>
+          <a:p>
+            <a:pPr rtl="0"/>
+            <a:r>
+              <a:rPr lang="it-IT" dirty="0" err="1">
+                <a:latin typeface="Berlin Sans FB" panose="020E0602020502020306" pitchFamily="34" charset="0"/>
+              </a:rPr>
+              <a:t>Heuristic</a:t>
+            </a:r>
+            <a:r>
+              <a:rPr lang="it-IT" dirty="0">
+                <a:latin typeface="Berlin Sans FB" panose="020E0602020502020306" pitchFamily="34" charset="0"/>
+              </a:rPr>
+              <a:t> ii (TOP X) </a:t>
+            </a:r>
+            <a:r>
+              <a:rPr lang="it-IT" sz="1600" dirty="0">
+                <a:latin typeface="Berlin Sans FB" panose="020E0602020502020306" pitchFamily="34" charset="0"/>
+              </a:rPr>
+              <a:t>continue</a:t>
+            </a:r>
+          </a:p>
+        </p:txBody>
+      </p:sp>
+      <p:pic>
+        <p:nvPicPr>
+          <p:cNvPr id="3" name="Picture 2">
+            <a:extLst>
+              <a:ext uri="{FF2B5EF4-FFF2-40B4-BE49-F238E27FC236}">
+                <a16:creationId xmlns:a16="http://schemas.microsoft.com/office/drawing/2014/main" id="{3FFAFEDE-30C1-F2D7-A1BA-2FD0385FA5F8}"/>
+              </a:ext>
+            </a:extLst>
+          </p:cNvPr>
+          <p:cNvPicPr>
+            <a:picLocks noChangeAspect="1"/>
+          </p:cNvPicPr>
+          <p:nvPr/>
+        </p:nvPicPr>
+        <p:blipFill>
+          <a:blip r:embed="rId3"/>
+          <a:stretch>
+            <a:fillRect/>
+          </a:stretch>
+        </p:blipFill>
+        <p:spPr>
+          <a:xfrm>
+            <a:off x="1298583" y="2174592"/>
+            <a:ext cx="9883955" cy="4217154"/>
+          </a:xfrm>
+          <a:prstGeom prst="rect">
+            <a:avLst/>
+          </a:prstGeom>
+        </p:spPr>
+      </p:pic>
+    </p:spTree>
+    <p:extLst>
+      <p:ext uri="{BB962C8B-B14F-4D97-AF65-F5344CB8AC3E}">
+        <p14:creationId xmlns:p14="http://schemas.microsoft.com/office/powerpoint/2010/main" val="254546206"/>
       </p:ext>
     </p:extLst>
   </p:cSld>
@@ -13333,116 +13035,6 @@
               <a:rPr lang="it-IT" dirty="0" err="1">
                 <a:latin typeface="Berlin Sans FB" panose="020E0602020502020306" pitchFamily="34" charset="0"/>
               </a:rPr>
-              <a:t>Heuristic</a:t>
-            </a:r>
-            <a:r>
-              <a:rPr lang="it-IT" dirty="0">
-                <a:latin typeface="Berlin Sans FB" panose="020E0602020502020306" pitchFamily="34" charset="0"/>
-              </a:rPr>
-              <a:t> ii (TOP X) </a:t>
-            </a:r>
-            <a:r>
-              <a:rPr lang="it-IT" sz="1600" dirty="0">
-                <a:latin typeface="Berlin Sans FB" panose="020E0602020502020306" pitchFamily="34" charset="0"/>
-              </a:rPr>
-              <a:t>continue</a:t>
-            </a:r>
-          </a:p>
-        </p:txBody>
-      </p:sp>
-      <p:pic>
-        <p:nvPicPr>
-          <p:cNvPr id="3" name="Picture 2">
-            <a:extLst>
-              <a:ext uri="{FF2B5EF4-FFF2-40B4-BE49-F238E27FC236}">
-                <a16:creationId xmlns:a16="http://schemas.microsoft.com/office/drawing/2014/main" id="{3FFAFEDE-30C1-F2D7-A1BA-2FD0385FA5F8}"/>
-              </a:ext>
-            </a:extLst>
-          </p:cNvPr>
-          <p:cNvPicPr>
-            <a:picLocks noChangeAspect="1"/>
-          </p:cNvPicPr>
-          <p:nvPr/>
-        </p:nvPicPr>
-        <p:blipFill>
-          <a:blip r:embed="rId3"/>
-          <a:stretch>
-            <a:fillRect/>
-          </a:stretch>
-        </p:blipFill>
-        <p:spPr>
-          <a:xfrm>
-            <a:off x="1298583" y="2174592"/>
-            <a:ext cx="9883955" cy="4217154"/>
-          </a:xfrm>
-          <a:prstGeom prst="rect">
-            <a:avLst/>
-          </a:prstGeom>
-        </p:spPr>
-      </p:pic>
-    </p:spTree>
-    <p:extLst>
-      <p:ext uri="{BB962C8B-B14F-4D97-AF65-F5344CB8AC3E}">
-        <p14:creationId xmlns:p14="http://schemas.microsoft.com/office/powerpoint/2010/main" val="254546206"/>
-      </p:ext>
-    </p:extLst>
-  </p:cSld>
-  <p:clrMapOvr>
-    <a:masterClrMapping/>
-  </p:clrMapOvr>
-</p:sld>
-</file>
-
-<file path=ppt/slides/slide21.xml><?xml version="1.0" encoding="utf-8"?>
-<p:sld xmlns:a="http://schemas.openxmlformats.org/drawingml/2006/main" xmlns:r="http://schemas.openxmlformats.org/officeDocument/2006/relationships" xmlns:p="http://schemas.openxmlformats.org/presentationml/2006/main">
-  <p:cSld>
-    <p:spTree>
-      <p:nvGrpSpPr>
-        <p:cNvPr id="1" name=""/>
-        <p:cNvGrpSpPr/>
-        <p:nvPr/>
-      </p:nvGrpSpPr>
-      <p:grpSpPr>
-        <a:xfrm>
-          <a:off x="0" y="0"/>
-          <a:ext cx="0" cy="0"/>
-          <a:chOff x="0" y="0"/>
-          <a:chExt cx="0" cy="0"/>
-        </a:xfrm>
-      </p:grpSpPr>
-      <p:sp>
-        <p:nvSpPr>
-          <p:cNvPr id="2" name="Titolo 1">
-            <a:extLst>
-              <a:ext uri="{FF2B5EF4-FFF2-40B4-BE49-F238E27FC236}">
-                <a16:creationId xmlns:a16="http://schemas.microsoft.com/office/drawing/2014/main" id="{921633EB-7DCB-4DDC-80AF-C885A3EE1245}"/>
-              </a:ext>
-            </a:extLst>
-          </p:cNvPr>
-          <p:cNvSpPr>
-            <a:spLocks noGrp="1"/>
-          </p:cNvSpPr>
-          <p:nvPr>
-            <p:ph type="title"/>
-          </p:nvPr>
-        </p:nvSpPr>
-        <p:spPr>
-          <a:xfrm>
-            <a:off x="581193" y="729658"/>
-            <a:ext cx="11029616" cy="988332"/>
-          </a:xfrm>
-        </p:spPr>
-        <p:txBody>
-          <a:bodyPr rtlCol="0" anchor="b">
-            <a:normAutofit/>
-          </a:bodyPr>
-          <a:lstStyle/>
-          <a:p>
-            <a:pPr rtl="0"/>
-            <a:r>
-              <a:rPr lang="it-IT" dirty="0" err="1">
-                <a:latin typeface="Berlin Sans FB" panose="020E0602020502020306" pitchFamily="34" charset="0"/>
-              </a:rPr>
               <a:t>heuristic</a:t>
             </a:r>
             <a:r>
@@ -13581,7 +13173,7 @@
 </p:sld>
 </file>
 
-<file path=ppt/slides/slide22.xml><?xml version="1.0" encoding="utf-8"?>
+<file path=ppt/slides/slide21.xml><?xml version="1.0" encoding="utf-8"?>
 <p:sld xmlns:a="http://schemas.openxmlformats.org/drawingml/2006/main" xmlns:r="http://schemas.openxmlformats.org/officeDocument/2006/relationships" xmlns:p="http://schemas.openxmlformats.org/presentationml/2006/main">
   <p:cSld>
     <p:spTree>
@@ -13790,7 +13382,7 @@
 </p:sld>
 </file>
 
-<file path=ppt/slides/slide23.xml><?xml version="1.0" encoding="utf-8"?>
+<file path=ppt/slides/slide22.xml><?xml version="1.0" encoding="utf-8"?>
 <p:sld xmlns:a="http://schemas.openxmlformats.org/drawingml/2006/main" xmlns:r="http://schemas.openxmlformats.org/officeDocument/2006/relationships" xmlns:p="http://schemas.openxmlformats.org/presentationml/2006/main">
   <p:cSld>
     <p:spTree>
@@ -13999,7 +13591,7 @@
 </p:sld>
 </file>
 
-<file path=ppt/slides/slide24.xml><?xml version="1.0" encoding="utf-8"?>
+<file path=ppt/slides/slide23.xml><?xml version="1.0" encoding="utf-8"?>
 <p:sld xmlns:a="http://schemas.openxmlformats.org/drawingml/2006/main" xmlns:r="http://schemas.openxmlformats.org/officeDocument/2006/relationships" xmlns:p="http://schemas.openxmlformats.org/presentationml/2006/main">
   <p:cSld>
     <p:bg>

</xml_diff>

<commit_message>
last version of power point presentation
</commit_message>
<xml_diff>
--- a/Data Protection & Privacy.pptx
+++ b/Data Protection & Privacy.pptx
@@ -4033,7 +4033,7 @@
             <a:pPr rtl="0"/>
             <a:fld id="{C0FA3576-2E34-44A5-91FF-3C53AC3DA648}" type="datetime1">
               <a:rPr lang="it-IT" smtClean="0"/>
-              <a:t>04/09/23</a:t>
+              <a:t>05/09/23</a:t>
             </a:fld>
             <a:endParaRPr lang="it-IT"/>
           </a:p>
@@ -4215,7 +4215,7 @@
             <a:fld id="{F8F21FEC-DF32-4E90-A279-29D5C0BB0773}" type="datetime1">
               <a:rPr lang="it-IT" smtClean="0"/>
               <a:pPr/>
-              <a:t>04/09/23</a:t>
+              <a:t>05/09/23</a:t>
             </a:fld>
             <a:endParaRPr lang="it-IT" dirty="0"/>
           </a:p>
@@ -6355,7 +6355,7 @@
             <a:pPr rtl="0"/>
             <a:fld id="{87A23933-3F77-4C59-A775-45E2435C8368}" type="datetime1">
               <a:rPr lang="it-IT" noProof="0" smtClean="0"/>
-              <a:t>04/09/23</a:t>
+              <a:t>05/09/23</a:t>
             </a:fld>
             <a:endParaRPr lang="it-IT" noProof="0"/>
           </a:p>
@@ -6620,7 +6620,7 @@
             <a:pPr rtl="0"/>
             <a:fld id="{4B4ECE9F-4108-4829-8F23-DFA9C926965D}" type="datetime1">
               <a:rPr lang="it-IT" noProof="0" smtClean="0"/>
-              <a:t>04/09/23</a:t>
+              <a:t>05/09/23</a:t>
             </a:fld>
             <a:endParaRPr lang="it-IT" noProof="0"/>
           </a:p>
@@ -6858,7 +6858,7 @@
             <a:pPr rtl="0"/>
             <a:fld id="{2AB59B6B-A2EF-4B30-AEF7-A3091D0F5449}" type="datetime1">
               <a:rPr lang="it-IT" noProof="0" smtClean="0"/>
-              <a:t>04/09/23</a:t>
+              <a:t>05/09/23</a:t>
             </a:fld>
             <a:endParaRPr lang="it-IT" noProof="0" dirty="0"/>
           </a:p>
@@ -7101,7 +7101,7 @@
             <a:pPr rtl="0"/>
             <a:fld id="{7F3FB14C-AC96-42E5-BE0B-73EFAA1A7EA7}" type="datetime1">
               <a:rPr lang="it-IT" noProof="0" smtClean="0"/>
-              <a:t>04/09/23</a:t>
+              <a:t>05/09/23</a:t>
             </a:fld>
             <a:endParaRPr lang="it-IT" noProof="0"/>
           </a:p>
@@ -7412,7 +7412,7 @@
             <a:pPr rtl="0"/>
             <a:fld id="{76327E91-20FF-43F1-A337-75953C73E7D7}" type="datetime1">
               <a:rPr lang="it-IT" noProof="0" smtClean="0"/>
-              <a:t>04/09/23</a:t>
+              <a:t>05/09/23</a:t>
             </a:fld>
             <a:endParaRPr lang="it-IT" noProof="0"/>
           </a:p>
@@ -7716,7 +7716,7 @@
             <a:pPr rtl="0"/>
             <a:fld id="{9EDCB701-B7F2-4988-9CFB-241C1D412354}" type="datetime1">
               <a:rPr lang="it-IT" noProof="0" smtClean="0"/>
-              <a:t>04/09/23</a:t>
+              <a:t>05/09/23</a:t>
             </a:fld>
             <a:endParaRPr lang="it-IT" noProof="0"/>
           </a:p>
@@ -8140,7 +8140,7 @@
             <a:pPr rtl="0"/>
             <a:fld id="{4B9B0459-76CC-4B94-A6C6-908B17D42BC8}" type="datetime1">
               <a:rPr lang="it-IT" noProof="0" smtClean="0"/>
-              <a:t>04/09/23</a:t>
+              <a:t>05/09/23</a:t>
             </a:fld>
             <a:endParaRPr lang="it-IT" noProof="0"/>
           </a:p>
@@ -8239,7 +8239,7 @@
             <a:pPr rtl="0"/>
             <a:fld id="{62D572E4-8572-44CF-B6FA-B15ECB2B0691}" type="datetime1">
               <a:rPr lang="it-IT" noProof="0" smtClean="0"/>
-              <a:t>04/09/23</a:t>
+              <a:t>05/09/23</a:t>
             </a:fld>
             <a:endParaRPr lang="it-IT" noProof="0"/>
           </a:p>
@@ -8405,7 +8405,7 @@
             <a:pPr rtl="0"/>
             <a:fld id="{5F266B29-8DDF-40ED-AC5D-ED73AC5A6521}" type="datetime1">
               <a:rPr lang="it-IT" noProof="0" smtClean="0"/>
-              <a:t>04/09/23</a:t>
+              <a:t>05/09/23</a:t>
             </a:fld>
             <a:endParaRPr lang="it-IT" noProof="0"/>
           </a:p>
@@ -8786,7 +8786,7 @@
             <a:pPr rtl="0"/>
             <a:fld id="{4CFC7787-2DFD-4221-B49C-354C37128239}" type="datetime1">
               <a:rPr lang="it-IT" noProof="0" smtClean="0"/>
-              <a:t>04/09/23</a:t>
+              <a:t>05/09/23</a:t>
             </a:fld>
             <a:endParaRPr lang="it-IT" noProof="0"/>
           </a:p>
@@ -9079,7 +9079,7 @@
             <a:pPr rtl="0"/>
             <a:fld id="{D3F07A8F-C5D3-4128-B052-E864993A59CE}" type="datetime1">
               <a:rPr lang="it-IT" noProof="0" smtClean="0"/>
-              <a:t>04/09/23</a:t>
+              <a:t>05/09/23</a:t>
             </a:fld>
             <a:endParaRPr lang="it-IT" noProof="0"/>
           </a:p>
@@ -9293,7 +9293,7 @@
             <a:pPr rtl="0"/>
             <a:fld id="{A36BACEF-F5E2-445B-BCCF-A68C06C41D7B}" type="datetime1">
               <a:rPr lang="it-IT" noProof="0" smtClean="0"/>
-              <a:t>04/09/23</a:t>
+              <a:t>05/09/23</a:t>
             </a:fld>
             <a:endParaRPr lang="it-IT" noProof="0" dirty="0"/>
           </a:p>
@@ -10747,7 +10747,7 @@
         </p:blipFill>
         <p:spPr>
           <a:xfrm>
-            <a:off x="5424546" y="3242821"/>
+            <a:off x="5382601" y="3242821"/>
             <a:ext cx="6701466" cy="3490701"/>
           </a:xfrm>
           <a:prstGeom prst="roundRect">

</xml_diff>